<commit_message>
added some lessons learned
</commit_message>
<xml_diff>
--- a/finalProjectPresentation.pptx
+++ b/finalProjectPresentation.pptx
@@ -107,6 +107,22 @@
       </a:defRPr>
     </a:lvl9pPr>
   </p:defaultTextStyle>
+  <p:extLst>
+    <p:ext uri="{EFAFB233-063F-42B5-8137-9DF3F51BA10A}">
+      <p15:sldGuideLst xmlns:p15="http://schemas.microsoft.com/office/powerpoint/2012/main">
+        <p15:guide id="1" orient="horz" pos="2160">
+          <p15:clr>
+            <a:srgbClr val="A4A3A4"/>
+          </p15:clr>
+        </p15:guide>
+        <p15:guide id="2" pos="2880">
+          <p15:clr>
+            <a:srgbClr val="A4A3A4"/>
+          </p15:clr>
+        </p15:guide>
+      </p15:sldGuideLst>
+    </p:ext>
+  </p:extLst>
 </p:presentation>
 </file>
 
@@ -297,7 +313,7 @@
           <a:p>
             <a:fld id="{47105AA4-2A3B-4D41-A4AA-FE7D22DD3682}" type="datetimeFigureOut">
               <a:rPr lang="en-US" smtClean="0"/>
-              <a:t>12/2/2014</a:t>
+              <a:t>12/3/2014</a:t>
             </a:fld>
             <a:endParaRPr lang="en-US"/>
           </a:p>
@@ -462,7 +478,7 @@
           <a:p>
             <a:fld id="{47105AA4-2A3B-4D41-A4AA-FE7D22DD3682}" type="datetimeFigureOut">
               <a:rPr lang="en-US" smtClean="0"/>
-              <a:t>12/2/2014</a:t>
+              <a:t>12/3/2014</a:t>
             </a:fld>
             <a:endParaRPr lang="en-US"/>
           </a:p>
@@ -637,7 +653,7 @@
           <a:p>
             <a:fld id="{47105AA4-2A3B-4D41-A4AA-FE7D22DD3682}" type="datetimeFigureOut">
               <a:rPr lang="en-US" smtClean="0"/>
-              <a:t>12/2/2014</a:t>
+              <a:t>12/3/2014</a:t>
             </a:fld>
             <a:endParaRPr lang="en-US"/>
           </a:p>
@@ -802,7 +818,7 @@
           <a:p>
             <a:fld id="{47105AA4-2A3B-4D41-A4AA-FE7D22DD3682}" type="datetimeFigureOut">
               <a:rPr lang="en-US" smtClean="0"/>
-              <a:t>12/2/2014</a:t>
+              <a:t>12/3/2014</a:t>
             </a:fld>
             <a:endParaRPr lang="en-US"/>
           </a:p>
@@ -1041,7 +1057,7 @@
           <a:p>
             <a:fld id="{47105AA4-2A3B-4D41-A4AA-FE7D22DD3682}" type="datetimeFigureOut">
               <a:rPr lang="en-US" smtClean="0"/>
-              <a:t>12/2/2014</a:t>
+              <a:t>12/3/2014</a:t>
             </a:fld>
             <a:endParaRPr lang="en-US"/>
           </a:p>
@@ -1131,7 +1147,7 @@
           <a:p>
             <a:fld id="{47105AA4-2A3B-4D41-A4AA-FE7D22DD3682}" type="datetimeFigureOut">
               <a:rPr lang="en-US" smtClean="0"/>
-              <a:t>12/2/2014</a:t>
+              <a:t>12/3/2014</a:t>
             </a:fld>
             <a:endParaRPr lang="en-US"/>
           </a:p>
@@ -1505,7 +1521,7 @@
           <a:p>
             <a:fld id="{47105AA4-2A3B-4D41-A4AA-FE7D22DD3682}" type="datetimeFigureOut">
               <a:rPr lang="en-US" smtClean="0"/>
-              <a:t>12/2/2014</a:t>
+              <a:t>12/3/2014</a:t>
             </a:fld>
             <a:endParaRPr lang="en-US"/>
           </a:p>
@@ -1760,7 +1776,7 @@
           <a:p>
             <a:fld id="{47105AA4-2A3B-4D41-A4AA-FE7D22DD3682}" type="datetimeFigureOut">
               <a:rPr lang="en-US" smtClean="0"/>
-              <a:t>12/2/2014</a:t>
+              <a:t>12/3/2014</a:t>
             </a:fld>
             <a:endParaRPr lang="en-US"/>
           </a:p>
@@ -1850,7 +1866,7 @@
           <a:p>
             <a:fld id="{47105AA4-2A3B-4D41-A4AA-FE7D22DD3682}" type="datetimeFigureOut">
               <a:rPr lang="en-US" smtClean="0"/>
-              <a:t>12/2/2014</a:t>
+              <a:t>12/3/2014</a:t>
             </a:fld>
             <a:endParaRPr lang="en-US"/>
           </a:p>
@@ -2124,7 +2140,7 @@
           <a:p>
             <a:fld id="{47105AA4-2A3B-4D41-A4AA-FE7D22DD3682}" type="datetimeFigureOut">
               <a:rPr lang="en-US" smtClean="0"/>
-              <a:t>12/2/2014</a:t>
+              <a:t>12/3/2014</a:t>
             </a:fld>
             <a:endParaRPr lang="en-US"/>
           </a:p>
@@ -2396,7 +2412,7 @@
           <a:p>
             <a:fld id="{47105AA4-2A3B-4D41-A4AA-FE7D22DD3682}" type="datetimeFigureOut">
               <a:rPr lang="en-US" smtClean="0"/>
-              <a:t>12/2/2014</a:t>
+              <a:t>12/3/2014</a:t>
             </a:fld>
             <a:endParaRPr lang="en-US"/>
           </a:p>
@@ -2696,7 +2712,7 @@
           <a:p>
             <a:fld id="{47105AA4-2A3B-4D41-A4AA-FE7D22DD3682}" type="datetimeFigureOut">
               <a:rPr lang="en-US" smtClean="0"/>
-              <a:t>12/2/2014</a:t>
+              <a:t>12/3/2014</a:t>
             </a:fld>
             <a:endParaRPr lang="en-US"/>
           </a:p>
@@ -3187,7 +3203,27 @@
           <a:p>
             <a:r>
               <a:rPr lang="en-US" dirty="0"/>
-              <a:t>Wacky Waving Inflatable Flailing Arm Tube Men (WWIFATM)</a:t>
+              <a:t>Wacky Wavy Inflatable Arm Flailing </a:t>
+            </a:r>
+            <a:r>
+              <a:rPr lang="en-US" dirty="0" smtClean="0"/>
+              <a:t>Tube </a:t>
+            </a:r>
+            <a:r>
+              <a:rPr lang="en-US" dirty="0"/>
+              <a:t>Men </a:t>
+            </a:r>
+            <a:r>
+              <a:rPr lang="en-US"/>
+              <a:t>(</a:t>
+            </a:r>
+            <a:r>
+              <a:rPr lang="en-US" smtClean="0"/>
+              <a:t>WWIAFTM</a:t>
+            </a:r>
+            <a:r>
+              <a:rPr lang="en-US" dirty="0"/>
+              <a:t>)</a:t>
             </a:r>
           </a:p>
           <a:p>
@@ -3534,8 +3570,29 @@
             </a:r>
             <a:r>
               <a:rPr lang="en-US" dirty="0" smtClean="0"/>
-              <a:t>() when repaint() is involved.</a:t>
-            </a:r>
+              <a:t>() when repaint() is involved</a:t>
+            </a:r>
+            <a:r>
+              <a:rPr lang="en-US" dirty="0" smtClean="0"/>
+              <a:t>.</a:t>
+            </a:r>
+          </a:p>
+          <a:p>
+            <a:r>
+              <a:rPr lang="en-US" dirty="0" smtClean="0"/>
+              <a:t>The order of the lines of code that generate the GUI can cause problems. (required minimize/resize for Swing components to appear)</a:t>
+            </a:r>
+          </a:p>
+          <a:p>
+            <a:r>
+              <a:rPr lang="en-US" dirty="0" smtClean="0"/>
+              <a:t>Sometimes it is acceptable to hard-code certain things (in this example, it was the four robots and their names/colors) because software can become too agile and result it a lot of </a:t>
+            </a:r>
+            <a:r>
+              <a:rPr lang="en-US" smtClean="0"/>
+              <a:t>“overhead”</a:t>
+            </a:r>
+            <a:endParaRPr lang="en-US" dirty="0" smtClean="0"/>
           </a:p>
           <a:p>
             <a:endParaRPr lang="en-US" dirty="0"/>

</xml_diff>